<commit_message>
added animation code to dbscan
</commit_message>
<xml_diff>
--- a/Presentations/DBscan.pptx
+++ b/Presentations/DBscan.pptx
@@ -14412,7 +14412,7 @@
       </p:sp>
       <p:pic>
         <p:nvPicPr>
-          <p:cNvPr id="123" name="Google Shape;123;p17" title="dbscan-ex.mov">
+          <p:cNvPr id="123" name="Google Shape;123;p17" title="download.mp4">
             <a:hlinkClick r:id="rId3"/>
           </p:cNvPr>
           <p:cNvPicPr preferRelativeResize="0"/>
@@ -14428,8 +14428,8 @@
         </p:blipFill>
         <p:spPr>
           <a:xfrm>
-            <a:off x="2996875" y="2408675"/>
-            <a:ext cx="5696751" cy="3797825"/>
+            <a:off x="3496930" y="2408663"/>
+            <a:ext cx="5198132" cy="3898613"/>
           </a:xfrm>
           <a:prstGeom prst="rect">
             <a:avLst/>

</xml_diff>